<commit_message>
Actualización de documentos y documentación de Prototipos
</commit_message>
<xml_diff>
--- a/Documentos/Estatus Solicitudes de Nómina.pptx
+++ b/Documentos/Estatus Solicitudes de Nómina.pptx
@@ -261,7 +261,7 @@
           <a:p>
             <a:fld id="{440015AB-466E-464C-BA3E-3457FB5CFC21}" type="datetimeFigureOut">
               <a:rPr lang="es-MX" smtClean="0"/>
-              <a:t>11/02/2019</a:t>
+              <a:t>12/02/2019</a:t>
             </a:fld>
             <a:endParaRPr lang="es-MX"/>
           </a:p>
@@ -461,7 +461,7 @@
           <a:p>
             <a:fld id="{440015AB-466E-464C-BA3E-3457FB5CFC21}" type="datetimeFigureOut">
               <a:rPr lang="es-MX" smtClean="0"/>
-              <a:t>11/02/2019</a:t>
+              <a:t>12/02/2019</a:t>
             </a:fld>
             <a:endParaRPr lang="es-MX"/>
           </a:p>
@@ -671,7 +671,7 @@
           <a:p>
             <a:fld id="{440015AB-466E-464C-BA3E-3457FB5CFC21}" type="datetimeFigureOut">
               <a:rPr lang="es-MX" smtClean="0"/>
-              <a:t>11/02/2019</a:t>
+              <a:t>12/02/2019</a:t>
             </a:fld>
             <a:endParaRPr lang="es-MX"/>
           </a:p>
@@ -871,7 +871,7 @@
           <a:p>
             <a:fld id="{440015AB-466E-464C-BA3E-3457FB5CFC21}" type="datetimeFigureOut">
               <a:rPr lang="es-MX" smtClean="0"/>
-              <a:t>11/02/2019</a:t>
+              <a:t>12/02/2019</a:t>
             </a:fld>
             <a:endParaRPr lang="es-MX"/>
           </a:p>
@@ -1147,7 +1147,7 @@
           <a:p>
             <a:fld id="{440015AB-466E-464C-BA3E-3457FB5CFC21}" type="datetimeFigureOut">
               <a:rPr lang="es-MX" smtClean="0"/>
-              <a:t>11/02/2019</a:t>
+              <a:t>12/02/2019</a:t>
             </a:fld>
             <a:endParaRPr lang="es-MX"/>
           </a:p>
@@ -1415,7 +1415,7 @@
           <a:p>
             <a:fld id="{440015AB-466E-464C-BA3E-3457FB5CFC21}" type="datetimeFigureOut">
               <a:rPr lang="es-MX" smtClean="0"/>
-              <a:t>11/02/2019</a:t>
+              <a:t>12/02/2019</a:t>
             </a:fld>
             <a:endParaRPr lang="es-MX"/>
           </a:p>
@@ -1830,7 +1830,7 @@
           <a:p>
             <a:fld id="{440015AB-466E-464C-BA3E-3457FB5CFC21}" type="datetimeFigureOut">
               <a:rPr lang="es-MX" smtClean="0"/>
-              <a:t>11/02/2019</a:t>
+              <a:t>12/02/2019</a:t>
             </a:fld>
             <a:endParaRPr lang="es-MX"/>
           </a:p>
@@ -1972,7 +1972,7 @@
           <a:p>
             <a:fld id="{440015AB-466E-464C-BA3E-3457FB5CFC21}" type="datetimeFigureOut">
               <a:rPr lang="es-MX" smtClean="0"/>
-              <a:t>11/02/2019</a:t>
+              <a:t>12/02/2019</a:t>
             </a:fld>
             <a:endParaRPr lang="es-MX"/>
           </a:p>
@@ -2085,7 +2085,7 @@
           <a:p>
             <a:fld id="{440015AB-466E-464C-BA3E-3457FB5CFC21}" type="datetimeFigureOut">
               <a:rPr lang="es-MX" smtClean="0"/>
-              <a:t>11/02/2019</a:t>
+              <a:t>12/02/2019</a:t>
             </a:fld>
             <a:endParaRPr lang="es-MX"/>
           </a:p>
@@ -2398,7 +2398,7 @@
           <a:p>
             <a:fld id="{440015AB-466E-464C-BA3E-3457FB5CFC21}" type="datetimeFigureOut">
               <a:rPr lang="es-MX" smtClean="0"/>
-              <a:t>11/02/2019</a:t>
+              <a:t>12/02/2019</a:t>
             </a:fld>
             <a:endParaRPr lang="es-MX"/>
           </a:p>
@@ -2687,7 +2687,7 @@
           <a:p>
             <a:fld id="{440015AB-466E-464C-BA3E-3457FB5CFC21}" type="datetimeFigureOut">
               <a:rPr lang="es-MX" smtClean="0"/>
-              <a:t>11/02/2019</a:t>
+              <a:t>12/02/2019</a:t>
             </a:fld>
             <a:endParaRPr lang="es-MX"/>
           </a:p>
@@ -2930,7 +2930,7 @@
           <a:p>
             <a:fld id="{440015AB-466E-464C-BA3E-3457FB5CFC21}" type="datetimeFigureOut">
               <a:rPr lang="es-MX" smtClean="0"/>
-              <a:t>11/02/2019</a:t>
+              <a:t>12/02/2019</a:t>
             </a:fld>
             <a:endParaRPr lang="es-MX"/>
           </a:p>
@@ -4343,49 +4343,6 @@
       </p:cxnSp>
       <p:cxnSp>
         <p:nvCxnSpPr>
-          <p:cNvPr id="40" name="Conector recto de flecha 39">
-            <a:extLst>
-              <a:ext uri="{FF2B5EF4-FFF2-40B4-BE49-F238E27FC236}">
-                <a16:creationId xmlns:a16="http://schemas.microsoft.com/office/drawing/2014/main" id="{476FC181-BE82-4649-B6ED-9516D584FA51}"/>
-              </a:ext>
-            </a:extLst>
-          </p:cNvPr>
-          <p:cNvCxnSpPr>
-            <a:cxnSpLocks/>
-            <a:stCxn id="6" idx="6"/>
-            <a:endCxn id="13" idx="3"/>
-          </p:cNvCxnSpPr>
-          <p:nvPr/>
-        </p:nvCxnSpPr>
-        <p:spPr>
-          <a:xfrm flipV="1">
-            <a:off x="6509685" y="4326094"/>
-            <a:ext cx="2875687" cy="1379144"/>
-          </a:xfrm>
-          <a:prstGeom prst="straightConnector1">
-            <a:avLst/>
-          </a:prstGeom>
-          <a:ln>
-            <a:tailEnd type="triangle"/>
-          </a:ln>
-        </p:spPr>
-        <p:style>
-          <a:lnRef idx="1">
-            <a:schemeClr val="accent1"/>
-          </a:lnRef>
-          <a:fillRef idx="0">
-            <a:schemeClr val="accent1"/>
-          </a:fillRef>
-          <a:effectRef idx="0">
-            <a:schemeClr val="accent1"/>
-          </a:effectRef>
-          <a:fontRef idx="minor">
-            <a:schemeClr val="tx1"/>
-          </a:fontRef>
-        </p:style>
-      </p:cxnSp>
-      <p:cxnSp>
-        <p:nvCxnSpPr>
           <p:cNvPr id="50" name="Conector recto de flecha 49">
             <a:extLst>
               <a:ext uri="{FF2B5EF4-FFF2-40B4-BE49-F238E27FC236}">

</xml_diff>